<commit_message>
Removed two slides from the ppt
</commit_message>
<xml_diff>
--- a/cypress/e2e/Git_GitHub_Beginners_Guide.pptx
+++ b/cypress/e2e/Git_GitHub_Beginners_Guide.pptx
@@ -5,14 +5,11 @@
     <p:sldMasterId id="2147483648" r:id="rId1"/>
   </p:sldMasterIdLst>
   <p:sldIdLst>
-    <p:sldId id="256" r:id="rId7"/>
-    <p:sldId id="257" r:id="rId8"/>
-    <p:sldId id="258" r:id="rId9"/>
-    <p:sldId id="259" r:id="rId10"/>
-    <p:sldId id="260" r:id="rId11"/>
-    <p:sldId id="261" r:id="rId12"/>
-    <p:sldId id="262" r:id="rId13"/>
-    <p:sldId id="263" r:id="rId14"/>
+    <p:sldId id="256" r:id="rId2"/>
+    <p:sldId id="260" r:id="rId3"/>
+    <p:sldId id="261" r:id="rId4"/>
+    <p:sldId id="262" r:id="rId5"/>
+    <p:sldId id="263" r:id="rId6"/>
   </p:sldIdLst>
   <p:sldSz cx="9144000" cy="6858000" type="screen4x3"/>
   <p:notesSz cx="6858000" cy="9144000"/>
@@ -111,6 +108,22 @@
       </a:defRPr>
     </a:lvl9pPr>
   </p:defaultTextStyle>
+  <p:extLst>
+    <p:ext uri="{EFAFB233-063F-42B5-8137-9DF3F51BA10A}">
+      <p15:sldGuideLst xmlns:p15="http://schemas.microsoft.com/office/powerpoint/2012/main">
+        <p15:guide id="1" orient="horz" pos="2160">
+          <p15:clr>
+            <a:srgbClr val="A4A3A4"/>
+          </p15:clr>
+        </p15:guide>
+        <p15:guide id="2" pos="2880">
+          <p15:clr>
+            <a:srgbClr val="A4A3A4"/>
+          </p15:clr>
+        </p15:guide>
+      </p15:sldGuideLst>
+    </p:ext>
+  </p:extLst>
 </p:presentation>
 </file>
 
@@ -295,7 +308,7 @@
           <a:p>
             <a:fld id="{5BCAD085-E8A6-8845-BD4E-CB4CCA059FC4}" type="datetimeFigureOut">
               <a:rPr lang="en-US" smtClean="0"/>
-              <a:t>1/27/13</a:t>
+              <a:t>5/26/2025</a:t>
             </a:fld>
             <a:endParaRPr lang="en-US"/>
           </a:p>
@@ -465,7 +478,7 @@
           <a:p>
             <a:fld id="{5BCAD085-E8A6-8845-BD4E-CB4CCA059FC4}" type="datetimeFigureOut">
               <a:rPr lang="en-US" smtClean="0"/>
-              <a:t>1/27/13</a:t>
+              <a:t>5/26/2025</a:t>
             </a:fld>
             <a:endParaRPr lang="en-US"/>
           </a:p>
@@ -645,7 +658,7 @@
           <a:p>
             <a:fld id="{5BCAD085-E8A6-8845-BD4E-CB4CCA059FC4}" type="datetimeFigureOut">
               <a:rPr lang="en-US" smtClean="0"/>
-              <a:t>1/27/13</a:t>
+              <a:t>5/26/2025</a:t>
             </a:fld>
             <a:endParaRPr lang="en-US"/>
           </a:p>
@@ -815,7 +828,7 @@
           <a:p>
             <a:fld id="{5BCAD085-E8A6-8845-BD4E-CB4CCA059FC4}" type="datetimeFigureOut">
               <a:rPr lang="en-US" smtClean="0"/>
-              <a:t>1/27/13</a:t>
+              <a:t>5/26/2025</a:t>
             </a:fld>
             <a:endParaRPr lang="en-US"/>
           </a:p>
@@ -1061,7 +1074,7 @@
           <a:p>
             <a:fld id="{5BCAD085-E8A6-8845-BD4E-CB4CCA059FC4}" type="datetimeFigureOut">
               <a:rPr lang="en-US" smtClean="0"/>
-              <a:t>1/27/13</a:t>
+              <a:t>5/26/2025</a:t>
             </a:fld>
             <a:endParaRPr lang="en-US"/>
           </a:p>
@@ -1349,7 +1362,7 @@
           <a:p>
             <a:fld id="{5BCAD085-E8A6-8845-BD4E-CB4CCA059FC4}" type="datetimeFigureOut">
               <a:rPr lang="en-US" smtClean="0"/>
-              <a:t>1/27/13</a:t>
+              <a:t>5/26/2025</a:t>
             </a:fld>
             <a:endParaRPr lang="en-US"/>
           </a:p>
@@ -1771,7 +1784,7 @@
           <a:p>
             <a:fld id="{5BCAD085-E8A6-8845-BD4E-CB4CCA059FC4}" type="datetimeFigureOut">
               <a:rPr lang="en-US" smtClean="0"/>
-              <a:t>1/27/13</a:t>
+              <a:t>5/26/2025</a:t>
             </a:fld>
             <a:endParaRPr lang="en-US"/>
           </a:p>
@@ -1889,7 +1902,7 @@
           <a:p>
             <a:fld id="{5BCAD085-E8A6-8845-BD4E-CB4CCA059FC4}" type="datetimeFigureOut">
               <a:rPr lang="en-US" smtClean="0"/>
-              <a:t>1/27/13</a:t>
+              <a:t>5/26/2025</a:t>
             </a:fld>
             <a:endParaRPr lang="en-US"/>
           </a:p>
@@ -1984,7 +1997,7 @@
           <a:p>
             <a:fld id="{5BCAD085-E8A6-8845-BD4E-CB4CCA059FC4}" type="datetimeFigureOut">
               <a:rPr lang="en-US" smtClean="0"/>
-              <a:t>1/27/13</a:t>
+              <a:t>5/26/2025</a:t>
             </a:fld>
             <a:endParaRPr lang="en-US"/>
           </a:p>
@@ -2261,7 +2274,7 @@
           <a:p>
             <a:fld id="{5BCAD085-E8A6-8845-BD4E-CB4CCA059FC4}" type="datetimeFigureOut">
               <a:rPr lang="en-US" smtClean="0"/>
-              <a:t>1/27/13</a:t>
+              <a:t>5/26/2025</a:t>
             </a:fld>
             <a:endParaRPr lang="en-US"/>
           </a:p>
@@ -2514,7 +2527,7 @@
           <a:p>
             <a:fld id="{5BCAD085-E8A6-8845-BD4E-CB4CCA059FC4}" type="datetimeFigureOut">
               <a:rPr lang="en-US" smtClean="0"/>
-              <a:t>1/27/13</a:t>
+              <a:t>5/26/2025</a:t>
             </a:fld>
             <a:endParaRPr lang="en-US"/>
           </a:p>
@@ -2727,7 +2740,7 @@
           <a:p>
             <a:fld id="{5BCAD085-E8A6-8845-BD4E-CB4CCA059FC4}" type="datetimeFigureOut">
               <a:rPr lang="en-US" smtClean="0"/>
-              <a:t>1/27/13</a:t>
+              <a:t>5/26/2025</a:t>
             </a:fld>
             <a:endParaRPr lang="en-US"/>
           </a:p>
@@ -3086,7 +3099,7 @@
 </file>
 
 <file path=ppt/slides/slide1.xml><?xml version="1.0" encoding="utf-8"?>
-<p:sld xmlns:a="http://schemas.openxmlformats.org/drawingml/2006/main" xmlns:p="http://schemas.openxmlformats.org/presentationml/2006/main" xmlns:r="http://schemas.openxmlformats.org/officeDocument/2006/relationships">
+<p:sld xmlns:a="http://schemas.openxmlformats.org/drawingml/2006/main" xmlns:r="http://schemas.openxmlformats.org/officeDocument/2006/relationships" xmlns:p="http://schemas.openxmlformats.org/presentationml/2006/main">
   <p:cSld>
     <p:spTree>
       <p:nvGrpSpPr>
@@ -3094,7 +3107,14 @@
         <p:cNvGrpSpPr/>
         <p:nvPr/>
       </p:nvGrpSpPr>
-      <p:grpSpPr/>
+      <p:grpSpPr>
+        <a:xfrm>
+          <a:off x="0" y="0"/>
+          <a:ext cx="0" cy="0"/>
+          <a:chOff x="0" y="0"/>
+          <a:chExt cx="0" cy="0"/>
+        </a:xfrm>
+      </p:grpSpPr>
       <p:sp>
         <p:nvSpPr>
           <p:cNvPr id="2" name="Title 1"/>
@@ -3146,7 +3166,7 @@
 </file>
 
 <file path=ppt/slides/slide2.xml><?xml version="1.0" encoding="utf-8"?>
-<p:sld xmlns:a="http://schemas.openxmlformats.org/drawingml/2006/main" xmlns:p="http://schemas.openxmlformats.org/presentationml/2006/main" xmlns:r="http://schemas.openxmlformats.org/officeDocument/2006/relationships">
+<p:sld xmlns:a="http://schemas.openxmlformats.org/drawingml/2006/main" xmlns:r="http://schemas.openxmlformats.org/officeDocument/2006/relationships" xmlns:p="http://schemas.openxmlformats.org/presentationml/2006/main">
   <p:cSld>
     <p:spTree>
       <p:nvGrpSpPr>
@@ -3154,7 +3174,14 @@
         <p:cNvGrpSpPr/>
         <p:nvPr/>
       </p:nvGrpSpPr>
-      <p:grpSpPr/>
+      <p:grpSpPr>
+        <a:xfrm>
+          <a:off x="0" y="0"/>
+          <a:ext cx="0" cy="0"/>
+          <a:chOff x="0" y="0"/>
+          <a:chExt cx="0" cy="0"/>
+        </a:xfrm>
+      </p:grpSpPr>
       <p:sp>
         <p:nvSpPr>
           <p:cNvPr id="2" name="Title 1"/>
@@ -3171,7 +3198,7 @@
           <a:lstStyle/>
           <a:p>
             <a:r>
-              <a:t>Introduction to Git and GitHub</a:t>
+              <a:t>Working with Branches</a:t>
             </a:r>
           </a:p>
         </p:txBody>
@@ -3192,7 +3219,27 @@
           <a:lstStyle/>
           <a:p>
             <a:r>
-              <a:t>Git is a distributed version control system that helps developers track changes in their codebase. GitHub is a cloud-based hosting service that lets you manage Git repositories online and collaborate with others.</a:t>
+              <a:t>git branch - List branches</a:t>
+            </a:r>
+          </a:p>
+          <a:p>
+            <a:r>
+              <a:t>git branch &lt;name&gt; - Create a new branch</a:t>
+            </a:r>
+          </a:p>
+          <a:p>
+            <a:r>
+              <a:t>git checkout &lt;name&gt; - Switch to a branch</a:t>
+            </a:r>
+          </a:p>
+          <a:p>
+            <a:r>
+              <a:t>git merge &lt;name&gt; - Merge a branch into current branch</a:t>
+            </a:r>
+          </a:p>
+          <a:p>
+            <a:r>
+              <a:t>git branch -d &lt;name&gt; - Delete a branch</a:t>
             </a:r>
           </a:p>
         </p:txBody>
@@ -3206,7 +3253,7 @@
 </file>
 
 <file path=ppt/slides/slide3.xml><?xml version="1.0" encoding="utf-8"?>
-<p:sld xmlns:a="http://schemas.openxmlformats.org/drawingml/2006/main" xmlns:p="http://schemas.openxmlformats.org/presentationml/2006/main" xmlns:r="http://schemas.openxmlformats.org/officeDocument/2006/relationships">
+<p:sld xmlns:a="http://schemas.openxmlformats.org/drawingml/2006/main" xmlns:r="http://schemas.openxmlformats.org/officeDocument/2006/relationships" xmlns:p="http://schemas.openxmlformats.org/presentationml/2006/main">
   <p:cSld>
     <p:spTree>
       <p:nvGrpSpPr>
@@ -3214,7 +3261,14 @@
         <p:cNvGrpSpPr/>
         <p:nvPr/>
       </p:nvGrpSpPr>
-      <p:grpSpPr/>
+      <p:grpSpPr>
+        <a:xfrm>
+          <a:off x="0" y="0"/>
+          <a:ext cx="0" cy="0"/>
+          <a:chOff x="0" y="0"/>
+          <a:chExt cx="0" cy="0"/>
+        </a:xfrm>
+      </p:grpSpPr>
       <p:sp>
         <p:nvSpPr>
           <p:cNvPr id="2" name="Title 1"/>
@@ -3231,7 +3285,7 @@
           <a:lstStyle/>
           <a:p>
             <a:r>
-              <a:t>Installing Git</a:t>
+              <a:t>Working with GitHub</a:t>
             </a:r>
           </a:p>
         </p:txBody>
@@ -3248,22 +3302,43 @@
         </p:nvSpPr>
         <p:spPr/>
         <p:txBody>
-          <a:bodyPr/>
-          <a:lstStyle/>
-          <a:p>
-            <a:r>
-              <a:t>Download Git from https://git-scm.com/downloads and install it following the setup instructions. After installation, configure your identity:</a:t>
-            </a:r>
-          </a:p>
-          <a:p/>
-          <a:p>
-            <a:r>
-              <a:t>git config --global user.name "Your Name"</a:t>
-            </a:r>
-          </a:p>
-          <a:p>
-            <a:r>
-              <a:t>git config --global user.email "you@example.com"</a:t>
+          <a:bodyPr>
+            <a:normAutofit fontScale="92500"/>
+          </a:bodyPr>
+          <a:lstStyle/>
+          <a:p>
+            <a:r>
+              <a:t>1. Create a GitHub account at https://github.com</a:t>
+            </a:r>
+          </a:p>
+          <a:p>
+            <a:r>
+              <a:t>2. Create a new repository</a:t>
+            </a:r>
+          </a:p>
+          <a:p>
+            <a:r>
+              <a:t>3. Connect local repo to GitHub:</a:t>
+            </a:r>
+          </a:p>
+          <a:p>
+            <a:r>
+              <a:t>   git remote add origin https://github.com/user/repo.git</a:t>
+            </a:r>
+          </a:p>
+          <a:p>
+            <a:r>
+              <a:t>   git push -u origin master</a:t>
+            </a:r>
+          </a:p>
+          <a:p>
+            <a:r>
+              <a:t>4. Pull changes from GitHub:</a:t>
+            </a:r>
+          </a:p>
+          <a:p>
+            <a:r>
+              <a:t>   git pull origin master</a:t>
             </a:r>
           </a:p>
         </p:txBody>
@@ -3277,7 +3352,7 @@
 </file>
 
 <file path=ppt/slides/slide4.xml><?xml version="1.0" encoding="utf-8"?>
-<p:sld xmlns:a="http://schemas.openxmlformats.org/drawingml/2006/main" xmlns:p="http://schemas.openxmlformats.org/presentationml/2006/main" xmlns:r="http://schemas.openxmlformats.org/officeDocument/2006/relationships">
+<p:sld xmlns:a="http://schemas.openxmlformats.org/drawingml/2006/main" xmlns:r="http://schemas.openxmlformats.org/officeDocument/2006/relationships" xmlns:p="http://schemas.openxmlformats.org/presentationml/2006/main">
   <p:cSld>
     <p:spTree>
       <p:nvGrpSpPr>
@@ -3285,7 +3360,14 @@
         <p:cNvGrpSpPr/>
         <p:nvPr/>
       </p:nvGrpSpPr>
-      <p:grpSpPr/>
+      <p:grpSpPr>
+        <a:xfrm>
+          <a:off x="0" y="0"/>
+          <a:ext cx="0" cy="0"/>
+          <a:chOff x="0" y="0"/>
+          <a:chExt cx="0" cy="0"/>
+        </a:xfrm>
+      </p:grpSpPr>
       <p:sp>
         <p:nvSpPr>
           <p:cNvPr id="2" name="Title 1"/>
@@ -3302,7 +3384,7 @@
           <a:lstStyle/>
           <a:p>
             <a:r>
-              <a:t>Basic Git Commands</a:t>
+              <a:t>Collaboration and Pull Requests</a:t>
             </a:r>
           </a:p>
         </p:txBody>
@@ -3323,47 +3405,27 @@
           <a:lstStyle/>
           <a:p>
             <a:r>
-              <a:t>git init - Initialize a new Git repository</a:t>
-            </a:r>
-          </a:p>
-          <a:p>
-            <a:r>
-              <a:t>git clone &lt;repo_url&gt; - Clone an existing repository</a:t>
-            </a:r>
-          </a:p>
-          <a:p>
-            <a:r>
-              <a:t>git status - Check the status of your files</a:t>
-            </a:r>
-          </a:p>
-          <a:p>
-            <a:r>
-              <a:t>git add &lt;file&gt; - Stage a file for commit</a:t>
-            </a:r>
-          </a:p>
-          <a:p>
-            <a:r>
-              <a:t>git commit -m "message" - Commit staged changes</a:t>
-            </a:r>
-          </a:p>
-          <a:p>
-            <a:r>
-              <a:t>git log - View commit history</a:t>
-            </a:r>
-          </a:p>
-          <a:p>
-            <a:r>
-              <a:t>git diff - View file changes</a:t>
-            </a:r>
-          </a:p>
-          <a:p>
-            <a:r>
-              <a:t>git reset &lt;file&gt; - Unstage a file</a:t>
-            </a:r>
-          </a:p>
-          <a:p>
-            <a:r>
-              <a:t>git rm &lt;file&gt; - Remove a file from repo and disk</a:t>
+              <a:t>1. Fork a repository</a:t>
+            </a:r>
+          </a:p>
+          <a:p>
+            <a:r>
+              <a:t>2. Clone your fork</a:t>
+            </a:r>
+          </a:p>
+          <a:p>
+            <a:r>
+              <a:t>3. Make changes and push them</a:t>
+            </a:r>
+          </a:p>
+          <a:p>
+            <a:r>
+              <a:t>4. Open a Pull Request on GitHub</a:t>
+            </a:r>
+          </a:p>
+          <a:p>
+            <a:r>
+              <a:t>5. Review and merge changes</a:t>
             </a:r>
           </a:p>
         </p:txBody>
@@ -3377,7 +3439,7 @@
 </file>
 
 <file path=ppt/slides/slide5.xml><?xml version="1.0" encoding="utf-8"?>
-<p:sld xmlns:a="http://schemas.openxmlformats.org/drawingml/2006/main" xmlns:p="http://schemas.openxmlformats.org/presentationml/2006/main" xmlns:r="http://schemas.openxmlformats.org/officeDocument/2006/relationships">
+<p:sld xmlns:a="http://schemas.openxmlformats.org/drawingml/2006/main" xmlns:r="http://schemas.openxmlformats.org/officeDocument/2006/relationships" xmlns:p="http://schemas.openxmlformats.org/presentationml/2006/main">
   <p:cSld>
     <p:spTree>
       <p:nvGrpSpPr>
@@ -3385,257 +3447,14 @@
         <p:cNvGrpSpPr/>
         <p:nvPr/>
       </p:nvGrpSpPr>
-      <p:grpSpPr/>
-      <p:sp>
-        <p:nvSpPr>
-          <p:cNvPr id="2" name="Title 1"/>
-          <p:cNvSpPr>
-            <a:spLocks noGrp="1"/>
-          </p:cNvSpPr>
-          <p:nvPr>
-            <p:ph type="title"/>
-          </p:nvPr>
-        </p:nvSpPr>
-        <p:spPr/>
-        <p:txBody>
-          <a:bodyPr/>
-          <a:lstStyle/>
-          <a:p>
-            <a:r>
-              <a:t>Working with Branches</a:t>
-            </a:r>
-          </a:p>
-        </p:txBody>
-      </p:sp>
-      <p:sp>
-        <p:nvSpPr>
-          <p:cNvPr id="3" name="Content Placeholder 2"/>
-          <p:cNvSpPr>
-            <a:spLocks noGrp="1"/>
-          </p:cNvSpPr>
-          <p:nvPr>
-            <p:ph idx="1"/>
-          </p:nvPr>
-        </p:nvSpPr>
-        <p:spPr/>
-        <p:txBody>
-          <a:bodyPr/>
-          <a:lstStyle/>
-          <a:p>
-            <a:r>
-              <a:t>git branch - List branches</a:t>
-            </a:r>
-          </a:p>
-          <a:p>
-            <a:r>
-              <a:t>git branch &lt;name&gt; - Create a new branch</a:t>
-            </a:r>
-          </a:p>
-          <a:p>
-            <a:r>
-              <a:t>git checkout &lt;name&gt; - Switch to a branch</a:t>
-            </a:r>
-          </a:p>
-          <a:p>
-            <a:r>
-              <a:t>git merge &lt;name&gt; - Merge a branch into current branch</a:t>
-            </a:r>
-          </a:p>
-          <a:p>
-            <a:r>
-              <a:t>git branch -d &lt;name&gt; - Delete a branch</a:t>
-            </a:r>
-          </a:p>
-        </p:txBody>
-      </p:sp>
-    </p:spTree>
-  </p:cSld>
-  <p:clrMapOvr>
-    <a:masterClrMapping/>
-  </p:clrMapOvr>
-</p:sld>
-</file>
-
-<file path=ppt/slides/slide6.xml><?xml version="1.0" encoding="utf-8"?>
-<p:sld xmlns:a="http://schemas.openxmlformats.org/drawingml/2006/main" xmlns:p="http://schemas.openxmlformats.org/presentationml/2006/main" xmlns:r="http://schemas.openxmlformats.org/officeDocument/2006/relationships">
-  <p:cSld>
-    <p:spTree>
-      <p:nvGrpSpPr>
-        <p:cNvPr id="1" name=""/>
-        <p:cNvGrpSpPr/>
-        <p:nvPr/>
-      </p:nvGrpSpPr>
-      <p:grpSpPr/>
-      <p:sp>
-        <p:nvSpPr>
-          <p:cNvPr id="2" name="Title 1"/>
-          <p:cNvSpPr>
-            <a:spLocks noGrp="1"/>
-          </p:cNvSpPr>
-          <p:nvPr>
-            <p:ph type="title"/>
-          </p:nvPr>
-        </p:nvSpPr>
-        <p:spPr/>
-        <p:txBody>
-          <a:bodyPr/>
-          <a:lstStyle/>
-          <a:p>
-            <a:r>
-              <a:t>Working with GitHub</a:t>
-            </a:r>
-          </a:p>
-        </p:txBody>
-      </p:sp>
-      <p:sp>
-        <p:nvSpPr>
-          <p:cNvPr id="3" name="Content Placeholder 2"/>
-          <p:cNvSpPr>
-            <a:spLocks noGrp="1"/>
-          </p:cNvSpPr>
-          <p:nvPr>
-            <p:ph idx="1"/>
-          </p:nvPr>
-        </p:nvSpPr>
-        <p:spPr/>
-        <p:txBody>
-          <a:bodyPr/>
-          <a:lstStyle/>
-          <a:p>
-            <a:r>
-              <a:t>1. Create a GitHub account at https://github.com</a:t>
-            </a:r>
-          </a:p>
-          <a:p>
-            <a:r>
-              <a:t>2. Create a new repository</a:t>
-            </a:r>
-          </a:p>
-          <a:p>
-            <a:r>
-              <a:t>3. Connect local repo to GitHub:</a:t>
-            </a:r>
-          </a:p>
-          <a:p>
-            <a:r>
-              <a:t>   git remote add origin https://github.com/user/repo.git</a:t>
-            </a:r>
-          </a:p>
-          <a:p>
-            <a:r>
-              <a:t>   git push -u origin master</a:t>
-            </a:r>
-          </a:p>
-          <a:p>
-            <a:r>
-              <a:t>4. Pull changes from GitHub:</a:t>
-            </a:r>
-          </a:p>
-          <a:p>
-            <a:r>
-              <a:t>   git pull origin master</a:t>
-            </a:r>
-          </a:p>
-        </p:txBody>
-      </p:sp>
-    </p:spTree>
-  </p:cSld>
-  <p:clrMapOvr>
-    <a:masterClrMapping/>
-  </p:clrMapOvr>
-</p:sld>
-</file>
-
-<file path=ppt/slides/slide7.xml><?xml version="1.0" encoding="utf-8"?>
-<p:sld xmlns:a="http://schemas.openxmlformats.org/drawingml/2006/main" xmlns:p="http://schemas.openxmlformats.org/presentationml/2006/main" xmlns:r="http://schemas.openxmlformats.org/officeDocument/2006/relationships">
-  <p:cSld>
-    <p:spTree>
-      <p:nvGrpSpPr>
-        <p:cNvPr id="1" name=""/>
-        <p:cNvGrpSpPr/>
-        <p:nvPr/>
-      </p:nvGrpSpPr>
-      <p:grpSpPr/>
-      <p:sp>
-        <p:nvSpPr>
-          <p:cNvPr id="2" name="Title 1"/>
-          <p:cNvSpPr>
-            <a:spLocks noGrp="1"/>
-          </p:cNvSpPr>
-          <p:nvPr>
-            <p:ph type="title"/>
-          </p:nvPr>
-        </p:nvSpPr>
-        <p:spPr/>
-        <p:txBody>
-          <a:bodyPr/>
-          <a:lstStyle/>
-          <a:p>
-            <a:r>
-              <a:t>Collaboration and Pull Requests</a:t>
-            </a:r>
-          </a:p>
-        </p:txBody>
-      </p:sp>
-      <p:sp>
-        <p:nvSpPr>
-          <p:cNvPr id="3" name="Content Placeholder 2"/>
-          <p:cNvSpPr>
-            <a:spLocks noGrp="1"/>
-          </p:cNvSpPr>
-          <p:nvPr>
-            <p:ph idx="1"/>
-          </p:nvPr>
-        </p:nvSpPr>
-        <p:spPr/>
-        <p:txBody>
-          <a:bodyPr/>
-          <a:lstStyle/>
-          <a:p>
-            <a:r>
-              <a:t>1. Fork a repository</a:t>
-            </a:r>
-          </a:p>
-          <a:p>
-            <a:r>
-              <a:t>2. Clone your fork</a:t>
-            </a:r>
-          </a:p>
-          <a:p>
-            <a:r>
-              <a:t>3. Make changes and push them</a:t>
-            </a:r>
-          </a:p>
-          <a:p>
-            <a:r>
-              <a:t>4. Open a Pull Request on GitHub</a:t>
-            </a:r>
-          </a:p>
-          <a:p>
-            <a:r>
-              <a:t>5. Review and merge changes</a:t>
-            </a:r>
-          </a:p>
-        </p:txBody>
-      </p:sp>
-    </p:spTree>
-  </p:cSld>
-  <p:clrMapOvr>
-    <a:masterClrMapping/>
-  </p:clrMapOvr>
-</p:sld>
-</file>
-
-<file path=ppt/slides/slide8.xml><?xml version="1.0" encoding="utf-8"?>
-<p:sld xmlns:a="http://schemas.openxmlformats.org/drawingml/2006/main" xmlns:p="http://schemas.openxmlformats.org/presentationml/2006/main" xmlns:r="http://schemas.openxmlformats.org/officeDocument/2006/relationships">
-  <p:cSld>
-    <p:spTree>
-      <p:nvGrpSpPr>
-        <p:cNvPr id="1" name=""/>
-        <p:cNvGrpSpPr/>
-        <p:nvPr/>
-      </p:nvGrpSpPr>
-      <p:grpSpPr/>
+      <p:grpSpPr>
+        <a:xfrm>
+          <a:off x="0" y="0"/>
+          <a:ext cx="0" cy="0"/>
+          <a:chOff x="0" y="0"/>
+          <a:chExt cx="0" cy="0"/>
+        </a:xfrm>
+      </p:grpSpPr>
       <p:sp>
         <p:nvSpPr>
           <p:cNvPr id="2" name="Title 1"/>

</xml_diff>